<commit_message>
Removed unnecessary files and updated graphs. Changed split_data method in temp.py to include BareNucli and removed null values.
</commit_message>
<xml_diff>
--- a/CS488 Final Report.pptx
+++ b/CS488 Final Report.pptx
@@ -234,7 +234,7 @@
           <a:p>
             <a:fld id="{043B725B-653D-4166-A8E9-72A38A1847CF}" type="datetimeFigureOut">
               <a:rPr lang="en-US"/>
-              <a:t>11/27/2019</a:t>
+              <a:t>11/29/19</a:t>
             </a:fld>
             <a:endParaRPr/>
           </a:p>
@@ -399,7 +399,7 @@
           <a:p>
             <a:fld id="{783F64CD-0576-4A9A-BD06-7889D6E60BDC}" type="datetimeFigureOut">
               <a:rPr lang="en-US"/>
-              <a:t>11/27/2019</a:t>
+              <a:t>11/29/19</a:t>
             </a:fld>
             <a:endParaRPr/>
           </a:p>
@@ -1223,7 +1223,7 @@
           <a:p>
             <a:fld id="{37CC0096-1860-4642-9CD2-0079EA5E7CD1}" type="datetimeFigureOut">
               <a:rPr lang="en-US"/>
-              <a:t>11/27/2019</a:t>
+              <a:t>11/29/19</a:t>
             </a:fld>
             <a:endParaRPr/>
           </a:p>
@@ -1472,7 +1472,7 @@
           <a:p>
             <a:fld id="{37CC0096-1860-4642-9CD2-0079EA5E7CD1}" type="datetimeFigureOut">
               <a:rPr lang="en-US"/>
-              <a:t>11/27/2019</a:t>
+              <a:t>11/29/19</a:t>
             </a:fld>
             <a:endParaRPr/>
           </a:p>
@@ -1658,7 +1658,7 @@
           <a:p>
             <a:fld id="{37CC0096-1860-4642-9CD2-0079EA5E7CD1}" type="datetimeFigureOut">
               <a:rPr lang="en-US"/>
-              <a:t>11/27/2019</a:t>
+              <a:t>11/29/19</a:t>
             </a:fld>
             <a:endParaRPr/>
           </a:p>
@@ -2189,7 +2189,7 @@
           <a:p>
             <a:fld id="{37CC0096-1860-4642-9CD2-0079EA5E7CD1}" type="datetimeFigureOut">
               <a:rPr lang="en-US"/>
-              <a:t>11/27/2019</a:t>
+              <a:t>11/29/19</a:t>
             </a:fld>
             <a:endParaRPr/>
           </a:p>
@@ -2641,7 +2641,7 @@
           <a:p>
             <a:fld id="{37CC0096-1860-4642-9CD2-0079EA5E7CD1}" type="datetimeFigureOut">
               <a:rPr lang="en-US"/>
-              <a:t>11/27/2019</a:t>
+              <a:t>11/29/19</a:t>
             </a:fld>
             <a:endParaRPr/>
           </a:p>
@@ -2771,7 +2771,7 @@
           <a:p>
             <a:fld id="{37CC0096-1860-4642-9CD2-0079EA5E7CD1}" type="datetimeFigureOut">
               <a:rPr lang="en-US"/>
-              <a:t>11/27/2019</a:t>
+              <a:t>11/29/19</a:t>
             </a:fld>
             <a:endParaRPr/>
           </a:p>
@@ -2878,7 +2878,7 @@
           <a:p>
             <a:fld id="{37CC0096-1860-4642-9CD2-0079EA5E7CD1}" type="datetimeFigureOut">
               <a:rPr lang="en-US"/>
-              <a:t>11/27/2019</a:t>
+              <a:t>11/29/19</a:t>
             </a:fld>
             <a:endParaRPr/>
           </a:p>
@@ -3867,7 +3867,7 @@
             <a:fld id="{37CC0096-1860-4642-9CD2-0079EA5E7CD1}" type="datetimeFigureOut">
               <a:rPr lang="en-US" smtClean="0"/>
               <a:pPr/>
-              <a:t>11/27/2019</a:t>
+              <a:t>11/29/19</a:t>
             </a:fld>
             <a:endParaRPr lang="en-US" dirty="0"/>
           </a:p>
@@ -5140,8 +5140,8 @@
         </p:blipFill>
         <p:spPr bwMode="auto">
           <a:xfrm>
-            <a:off x="1" y="800696"/>
-            <a:ext cx="7008810" cy="5256607"/>
+            <a:off x="1" y="1092729"/>
+            <a:ext cx="7008810" cy="4672540"/>
           </a:xfrm>
           <a:prstGeom prst="rect">
             <a:avLst/>
@@ -5149,15 +5149,7 @@
           <a:solidFill>
             <a:srgbClr val="FFFFFF"/>
           </a:solidFill>
-          <a:extLst>
-            <a:ext uri="{909E8E84-426E-40DD-AFC4-6F175D3DCCD1}">
-              <a14:hiddenFill xmlns:a14="http://schemas.microsoft.com/office/drawing/2010/main">
-                <a:solidFill>
-                  <a:srgbClr val="FFFFFF"/>
-                </a:solidFill>
-              </a14:hiddenFill>
-            </a:ext>
-          </a:extLst>
+          <a:extLst/>
         </p:spPr>
       </p:pic>
       <p:sp>
@@ -5334,8 +5326,8 @@
         </p:blipFill>
         <p:spPr bwMode="auto">
           <a:xfrm>
-            <a:off x="1" y="800696"/>
-            <a:ext cx="7008810" cy="5256607"/>
+            <a:off x="1" y="1092729"/>
+            <a:ext cx="7008810" cy="4672540"/>
           </a:xfrm>
           <a:prstGeom prst="rect">
             <a:avLst/>
@@ -5526,8 +5518,8 @@
         </p:blipFill>
         <p:spPr bwMode="auto">
           <a:xfrm>
-            <a:off x="1" y="1089809"/>
-            <a:ext cx="7008810" cy="4678380"/>
+            <a:off x="1" y="1092729"/>
+            <a:ext cx="7008810" cy="4672540"/>
           </a:xfrm>
           <a:prstGeom prst="rect">
             <a:avLst/>
@@ -5535,15 +5527,7 @@
           <a:solidFill>
             <a:srgbClr val="FFFFFF"/>
           </a:solidFill>
-          <a:extLst>
-            <a:ext uri="{909E8E84-426E-40DD-AFC4-6F175D3DCCD1}">
-              <a14:hiddenFill xmlns:a14="http://schemas.microsoft.com/office/drawing/2010/main">
-                <a:solidFill>
-                  <a:srgbClr val="FFFFFF"/>
-                </a:solidFill>
-              </a14:hiddenFill>
-            </a:ext>
-          </a:extLst>
+          <a:extLst/>
         </p:spPr>
       </p:pic>
       <p:sp>
@@ -5720,8 +5704,8 @@
         </p:blipFill>
         <p:spPr bwMode="auto">
           <a:xfrm>
-            <a:off x="1" y="1089809"/>
-            <a:ext cx="7008810" cy="4678380"/>
+            <a:off x="1" y="1092729"/>
+            <a:ext cx="7008810" cy="4672540"/>
           </a:xfrm>
           <a:prstGeom prst="rect">
             <a:avLst/>
@@ -5729,15 +5713,7 @@
           <a:solidFill>
             <a:srgbClr val="FFFFFF"/>
           </a:solidFill>
-          <a:extLst>
-            <a:ext uri="{909E8E84-426E-40DD-AFC4-6F175D3DCCD1}">
-              <a14:hiddenFill xmlns:a14="http://schemas.microsoft.com/office/drawing/2010/main">
-                <a:solidFill>
-                  <a:srgbClr val="FFFFFF"/>
-                </a:solidFill>
-              </a14:hiddenFill>
-            </a:ext>
-          </a:extLst>
+          <a:extLst/>
         </p:spPr>
       </p:pic>
       <p:sp>
@@ -5914,8 +5890,8 @@
         </p:blipFill>
         <p:spPr bwMode="auto">
           <a:xfrm>
-            <a:off x="1" y="1089809"/>
-            <a:ext cx="7008810" cy="4678380"/>
+            <a:off x="1" y="1092729"/>
+            <a:ext cx="7008810" cy="4672540"/>
           </a:xfrm>
           <a:prstGeom prst="rect">
             <a:avLst/>

</xml_diff>